<commit_message>
Update POTHOLE DETECTION FOR VISUALLY IMPAIRED USING YOLO V1.pptx
</commit_message>
<xml_diff>
--- a/presentation 1/POTHOLE DETECTION FOR VISUALLY IMPAIRED USING YOLO V1.pptx
+++ b/presentation 1/POTHOLE DETECTION FOR VISUALLY IMPAIRED USING YOLO V1.pptx
@@ -6926,49 +6926,6 @@
           </a:graphicData>
         </a:graphic>
       </p:graphicFrame>
-      <p:sp>
-        <p:nvSpPr>
-          <p:cNvPr id="4" name="TextBox 3">
-            <a:extLst>
-              <a:ext uri="{FF2B5EF4-FFF2-40B4-BE49-F238E27FC236}">
-                <a16:creationId xmlns:a16="http://schemas.microsoft.com/office/drawing/2014/main" id="{E79526DE-DB59-4E96-B084-F267A05665D8}"/>
-              </a:ext>
-            </a:extLst>
-          </p:cNvPr>
-          <p:cNvSpPr txBox="1"/>
-          <p:nvPr/>
-        </p:nvSpPr>
-        <p:spPr>
-          <a:xfrm>
-            <a:off x="23007" y="4881890"/>
-            <a:ext cx="577402" cy="261610"/>
-          </a:xfrm>
-          <a:prstGeom prst="rect">
-            <a:avLst/>
-          </a:prstGeom>
-          <a:noFill/>
-        </p:spPr>
-        <p:txBody>
-          <a:bodyPr wrap="none" rtlCol="0">
-            <a:spAutoFit/>
-          </a:bodyPr>
-          <a:lstStyle/>
-          <a:p>
-            <a:r>
-              <a:rPr lang="en-IN" sz="1100" dirty="0">
-                <a:solidFill>
-                  <a:schemeClr val="bg1">
-                    <a:lumMod val="50000"/>
-                  </a:schemeClr>
-                </a:solidFill>
-                <a:latin typeface="Times New Roman" panose="02020603050405020304" pitchFamily="18" charset="0"/>
-                <a:cs typeface="Times New Roman" panose="02020603050405020304" pitchFamily="18" charset="0"/>
-              </a:rPr>
-              <a:t>TITLE</a:t>
-            </a:r>
-          </a:p>
-        </p:txBody>
-      </p:sp>
     </p:spTree>
   </p:cSld>
   <p:clrMapOvr>
@@ -7067,49 +7024,6 @@
           </a:prstGeom>
         </p:spPr>
       </p:pic>
-      <p:sp>
-        <p:nvSpPr>
-          <p:cNvPr id="5" name="TextBox 4">
-            <a:extLst>
-              <a:ext uri="{FF2B5EF4-FFF2-40B4-BE49-F238E27FC236}">
-                <a16:creationId xmlns:a16="http://schemas.microsoft.com/office/drawing/2014/main" id="{62B1A201-408B-457A-A4C3-85CE70752F72}"/>
-              </a:ext>
-            </a:extLst>
-          </p:cNvPr>
-          <p:cNvSpPr txBox="1"/>
-          <p:nvPr/>
-        </p:nvSpPr>
-        <p:spPr>
-          <a:xfrm>
-            <a:off x="23007" y="4881890"/>
-            <a:ext cx="1178528" cy="261610"/>
-          </a:xfrm>
-          <a:prstGeom prst="rect">
-            <a:avLst/>
-          </a:prstGeom>
-          <a:noFill/>
-        </p:spPr>
-        <p:txBody>
-          <a:bodyPr wrap="none" rtlCol="0">
-            <a:spAutoFit/>
-          </a:bodyPr>
-          <a:lstStyle/>
-          <a:p>
-            <a:r>
-              <a:rPr lang="en-IN" sz="1100" dirty="0">
-                <a:solidFill>
-                  <a:schemeClr val="bg1">
-                    <a:lumMod val="50000"/>
-                  </a:schemeClr>
-                </a:solidFill>
-                <a:latin typeface="Times New Roman" panose="02020603050405020304" pitchFamily="18" charset="0"/>
-                <a:cs typeface="Times New Roman" panose="02020603050405020304" pitchFamily="18" charset="0"/>
-              </a:rPr>
-              <a:t>SYSTEM FLOW</a:t>
-            </a:r>
-          </a:p>
-        </p:txBody>
-      </p:sp>
     </p:spTree>
     <p:extLst>
       <p:ext uri="{BB962C8B-B14F-4D97-AF65-F5344CB8AC3E}">
@@ -7445,49 +7359,6 @@
               <a:latin typeface="Times New Roman" panose="02020603050405020304" pitchFamily="18" charset="0"/>
               <a:cs typeface="Times New Roman" panose="02020603050405020304" pitchFamily="18" charset="0"/>
             </a:endParaRPr>
-          </a:p>
-        </p:txBody>
-      </p:sp>
-      <p:sp>
-        <p:nvSpPr>
-          <p:cNvPr id="4" name="TextBox 3">
-            <a:extLst>
-              <a:ext uri="{FF2B5EF4-FFF2-40B4-BE49-F238E27FC236}">
-                <a16:creationId xmlns:a16="http://schemas.microsoft.com/office/drawing/2014/main" id="{0A1CB71C-5212-4632-8D48-13724EC14C2B}"/>
-              </a:ext>
-            </a:extLst>
-          </p:cNvPr>
-          <p:cNvSpPr txBox="1"/>
-          <p:nvPr/>
-        </p:nvSpPr>
-        <p:spPr>
-          <a:xfrm>
-            <a:off x="23007" y="4881890"/>
-            <a:ext cx="1178528" cy="261610"/>
-          </a:xfrm>
-          <a:prstGeom prst="rect">
-            <a:avLst/>
-          </a:prstGeom>
-          <a:noFill/>
-        </p:spPr>
-        <p:txBody>
-          <a:bodyPr wrap="none" rtlCol="0">
-            <a:spAutoFit/>
-          </a:bodyPr>
-          <a:lstStyle/>
-          <a:p>
-            <a:r>
-              <a:rPr lang="en-IN" sz="1100" dirty="0">
-                <a:solidFill>
-                  <a:schemeClr val="bg1">
-                    <a:lumMod val="50000"/>
-                  </a:schemeClr>
-                </a:solidFill>
-                <a:latin typeface="Times New Roman" panose="02020603050405020304" pitchFamily="18" charset="0"/>
-                <a:cs typeface="Times New Roman" panose="02020603050405020304" pitchFamily="18" charset="0"/>
-              </a:rPr>
-              <a:t>SYSTEM FLOW</a:t>
-            </a:r>
           </a:p>
         </p:txBody>
       </p:sp>
@@ -7906,49 +7777,6 @@
           </a:p>
         </p:txBody>
       </p:sp>
-      <p:sp>
-        <p:nvSpPr>
-          <p:cNvPr id="4" name="TextBox 3">
-            <a:extLst>
-              <a:ext uri="{FF2B5EF4-FFF2-40B4-BE49-F238E27FC236}">
-                <a16:creationId xmlns:a16="http://schemas.microsoft.com/office/drawing/2014/main" id="{6D6A636F-A1F3-4071-97C3-F4759775DC4B}"/>
-              </a:ext>
-            </a:extLst>
-          </p:cNvPr>
-          <p:cNvSpPr txBox="1"/>
-          <p:nvPr/>
-        </p:nvSpPr>
-        <p:spPr>
-          <a:xfrm>
-            <a:off x="23007" y="4881890"/>
-            <a:ext cx="1074333" cy="261610"/>
-          </a:xfrm>
-          <a:prstGeom prst="rect">
-            <a:avLst/>
-          </a:prstGeom>
-          <a:noFill/>
-        </p:spPr>
-        <p:txBody>
-          <a:bodyPr wrap="none" rtlCol="0">
-            <a:spAutoFit/>
-          </a:bodyPr>
-          <a:lstStyle/>
-          <a:p>
-            <a:r>
-              <a:rPr lang="en-IN" sz="1100" dirty="0">
-                <a:solidFill>
-                  <a:schemeClr val="bg1">
-                    <a:lumMod val="50000"/>
-                  </a:schemeClr>
-                </a:solidFill>
-                <a:latin typeface="Times New Roman" panose="02020603050405020304" pitchFamily="18" charset="0"/>
-                <a:cs typeface="Times New Roman" panose="02020603050405020304" pitchFamily="18" charset="0"/>
-              </a:rPr>
-              <a:t>REFERENCES</a:t>
-            </a:r>
-          </a:p>
-        </p:txBody>
-      </p:sp>
     </p:spTree>
     <p:extLst>
       <p:ext uri="{BB962C8B-B14F-4D97-AF65-F5344CB8AC3E}">
@@ -8124,49 +7952,6 @@
                 <a:cs typeface="Times New Roman" panose="02020603050405020304" pitchFamily="18" charset="0"/>
               </a:rPr>
               <a:t>Conventions : YOLO - You Only Look Once, VI – Visually Impaired.</a:t>
-            </a:r>
-          </a:p>
-        </p:txBody>
-      </p:sp>
-      <p:sp>
-        <p:nvSpPr>
-          <p:cNvPr id="4" name="TextBox 3">
-            <a:extLst>
-              <a:ext uri="{FF2B5EF4-FFF2-40B4-BE49-F238E27FC236}">
-                <a16:creationId xmlns:a16="http://schemas.microsoft.com/office/drawing/2014/main" id="{9FE1E8AE-8EF2-4B55-832A-97D4314B76FA}"/>
-              </a:ext>
-            </a:extLst>
-          </p:cNvPr>
-          <p:cNvSpPr txBox="1"/>
-          <p:nvPr/>
-        </p:nvSpPr>
-        <p:spPr>
-          <a:xfrm>
-            <a:off x="23007" y="4881890"/>
-            <a:ext cx="925253" cy="261610"/>
-          </a:xfrm>
-          <a:prstGeom prst="rect">
-            <a:avLst/>
-          </a:prstGeom>
-          <a:noFill/>
-        </p:spPr>
-        <p:txBody>
-          <a:bodyPr wrap="none" rtlCol="0">
-            <a:spAutoFit/>
-          </a:bodyPr>
-          <a:lstStyle/>
-          <a:p>
-            <a:r>
-              <a:rPr lang="en-IN" sz="1100" dirty="0">
-                <a:solidFill>
-                  <a:schemeClr val="bg1">
-                    <a:lumMod val="50000"/>
-                  </a:schemeClr>
-                </a:solidFill>
-                <a:latin typeface="Times New Roman" panose="02020603050405020304" pitchFamily="18" charset="0"/>
-                <a:cs typeface="Times New Roman" panose="02020603050405020304" pitchFamily="18" charset="0"/>
-              </a:rPr>
-              <a:t>ABSTRACT</a:t>
             </a:r>
           </a:p>
         </p:txBody>
@@ -8337,49 +8122,6 @@
           </a:p>
         </p:txBody>
       </p:sp>
-      <p:sp>
-        <p:nvSpPr>
-          <p:cNvPr id="4" name="TextBox 3">
-            <a:extLst>
-              <a:ext uri="{FF2B5EF4-FFF2-40B4-BE49-F238E27FC236}">
-                <a16:creationId xmlns:a16="http://schemas.microsoft.com/office/drawing/2014/main" id="{9FE1E8AE-8EF2-4B55-832A-97D4314B76FA}"/>
-              </a:ext>
-            </a:extLst>
-          </p:cNvPr>
-          <p:cNvSpPr txBox="1"/>
-          <p:nvPr/>
-        </p:nvSpPr>
-        <p:spPr>
-          <a:xfrm>
-            <a:off x="23007" y="4881890"/>
-            <a:ext cx="1255472" cy="261610"/>
-          </a:xfrm>
-          <a:prstGeom prst="rect">
-            <a:avLst/>
-          </a:prstGeom>
-          <a:noFill/>
-        </p:spPr>
-        <p:txBody>
-          <a:bodyPr wrap="none" rtlCol="0">
-            <a:spAutoFit/>
-          </a:bodyPr>
-          <a:lstStyle/>
-          <a:p>
-            <a:r>
-              <a:rPr lang="en-IN" sz="1100" dirty="0">
-                <a:solidFill>
-                  <a:schemeClr val="bg1">
-                    <a:lumMod val="50000"/>
-                  </a:schemeClr>
-                </a:solidFill>
-                <a:latin typeface="Times New Roman" panose="02020603050405020304" pitchFamily="18" charset="0"/>
-                <a:cs typeface="Times New Roman" panose="02020603050405020304" pitchFamily="18" charset="0"/>
-              </a:rPr>
-              <a:t>INTRODUCTION</a:t>
-            </a:r>
-          </a:p>
-        </p:txBody>
-      </p:sp>
     </p:spTree>
   </p:cSld>
   <p:clrMapOvr>
@@ -8538,49 +8280,6 @@
               <a:latin typeface="Times New Roman" panose="02020603050405020304" pitchFamily="18" charset="0"/>
               <a:cs typeface="Times New Roman" panose="02020603050405020304" pitchFamily="18" charset="0"/>
             </a:endParaRPr>
-          </a:p>
-        </p:txBody>
-      </p:sp>
-      <p:sp>
-        <p:nvSpPr>
-          <p:cNvPr id="4" name="TextBox 3">
-            <a:extLst>
-              <a:ext uri="{FF2B5EF4-FFF2-40B4-BE49-F238E27FC236}">
-                <a16:creationId xmlns:a16="http://schemas.microsoft.com/office/drawing/2014/main" id="{E1A1B6DE-DBD0-4EEE-A803-7E4F1B0545EC}"/>
-              </a:ext>
-            </a:extLst>
-          </p:cNvPr>
-          <p:cNvSpPr txBox="1"/>
-          <p:nvPr/>
-        </p:nvSpPr>
-        <p:spPr>
-          <a:xfrm>
-            <a:off x="23007" y="4881890"/>
-            <a:ext cx="1255472" cy="261610"/>
-          </a:xfrm>
-          <a:prstGeom prst="rect">
-            <a:avLst/>
-          </a:prstGeom>
-          <a:noFill/>
-        </p:spPr>
-        <p:txBody>
-          <a:bodyPr wrap="none" rtlCol="0">
-            <a:spAutoFit/>
-          </a:bodyPr>
-          <a:lstStyle/>
-          <a:p>
-            <a:r>
-              <a:rPr lang="en-IN" sz="1100" dirty="0">
-                <a:solidFill>
-                  <a:schemeClr val="bg1">
-                    <a:lumMod val="50000"/>
-                  </a:schemeClr>
-                </a:solidFill>
-                <a:latin typeface="Times New Roman" panose="02020603050405020304" pitchFamily="18" charset="0"/>
-                <a:cs typeface="Times New Roman" panose="02020603050405020304" pitchFamily="18" charset="0"/>
-              </a:rPr>
-              <a:t>INTRODUCTION</a:t>
-            </a:r>
           </a:p>
         </p:txBody>
       </p:sp>
@@ -9282,49 +8981,6 @@
           </a:graphicData>
         </a:graphic>
       </p:graphicFrame>
-      <p:sp>
-        <p:nvSpPr>
-          <p:cNvPr id="8" name="TextBox 7">
-            <a:extLst>
-              <a:ext uri="{FF2B5EF4-FFF2-40B4-BE49-F238E27FC236}">
-                <a16:creationId xmlns:a16="http://schemas.microsoft.com/office/drawing/2014/main" id="{CA82A952-BA4A-45E3-8D5E-210C4758B599}"/>
-              </a:ext>
-            </a:extLst>
-          </p:cNvPr>
-          <p:cNvSpPr txBox="1"/>
-          <p:nvPr/>
-        </p:nvSpPr>
-        <p:spPr>
-          <a:xfrm>
-            <a:off x="23007" y="4881890"/>
-            <a:ext cx="1574470" cy="261610"/>
-          </a:xfrm>
-          <a:prstGeom prst="rect">
-            <a:avLst/>
-          </a:prstGeom>
-          <a:noFill/>
-        </p:spPr>
-        <p:txBody>
-          <a:bodyPr wrap="none" rtlCol="0">
-            <a:spAutoFit/>
-          </a:bodyPr>
-          <a:lstStyle/>
-          <a:p>
-            <a:r>
-              <a:rPr lang="en-IN" sz="1100" dirty="0">
-                <a:solidFill>
-                  <a:schemeClr val="bg1">
-                    <a:lumMod val="50000"/>
-                  </a:schemeClr>
-                </a:solidFill>
-                <a:latin typeface="Times New Roman" panose="02020603050405020304" pitchFamily="18" charset="0"/>
-                <a:cs typeface="Times New Roman" panose="02020603050405020304" pitchFamily="18" charset="0"/>
-              </a:rPr>
-              <a:t>LITRATURE SURVEY</a:t>
-            </a:r>
-          </a:p>
-        </p:txBody>
-      </p:sp>
     </p:spTree>
     <p:extLst>
       <p:ext uri="{BB962C8B-B14F-4D97-AF65-F5344CB8AC3E}">
@@ -9409,49 +9065,6 @@
       </p:sp>
       <p:sp>
         <p:nvSpPr>
-          <p:cNvPr id="4" name="TextBox 3">
-            <a:extLst>
-              <a:ext uri="{FF2B5EF4-FFF2-40B4-BE49-F238E27FC236}">
-                <a16:creationId xmlns:a16="http://schemas.microsoft.com/office/drawing/2014/main" id="{9FE1E8AE-8EF2-4B55-832A-97D4314B76FA}"/>
-              </a:ext>
-            </a:extLst>
-          </p:cNvPr>
-          <p:cNvSpPr txBox="1"/>
-          <p:nvPr/>
-        </p:nvSpPr>
-        <p:spPr>
-          <a:xfrm>
-            <a:off x="23007" y="4881890"/>
-            <a:ext cx="1430200" cy="261610"/>
-          </a:xfrm>
-          <a:prstGeom prst="rect">
-            <a:avLst/>
-          </a:prstGeom>
-          <a:noFill/>
-        </p:spPr>
-        <p:txBody>
-          <a:bodyPr wrap="none" rtlCol="0">
-            <a:spAutoFit/>
-          </a:bodyPr>
-          <a:lstStyle/>
-          <a:p>
-            <a:r>
-              <a:rPr lang="en-IN" sz="1100" dirty="0">
-                <a:solidFill>
-                  <a:schemeClr val="bg1">
-                    <a:lumMod val="50000"/>
-                  </a:schemeClr>
-                </a:solidFill>
-                <a:latin typeface="Times New Roman" panose="02020603050405020304" pitchFamily="18" charset="0"/>
-                <a:cs typeface="Times New Roman" panose="02020603050405020304" pitchFamily="18" charset="0"/>
-              </a:rPr>
-              <a:t>EXISTING SYSTEM</a:t>
-            </a:r>
-          </a:p>
-        </p:txBody>
-      </p:sp>
-      <p:sp>
-        <p:nvSpPr>
           <p:cNvPr id="72" name="Google Shape;72;p16"/>
           <p:cNvSpPr txBox="1">
             <a:spLocks noGrp="1"/>
@@ -9577,49 +9190,6 @@
           <a:chExt cx="0" cy="0"/>
         </a:xfrm>
       </p:grpSpPr>
-      <p:sp>
-        <p:nvSpPr>
-          <p:cNvPr id="4" name="TextBox 3">
-            <a:extLst>
-              <a:ext uri="{FF2B5EF4-FFF2-40B4-BE49-F238E27FC236}">
-                <a16:creationId xmlns:a16="http://schemas.microsoft.com/office/drawing/2014/main" id="{9FE1E8AE-8EF2-4B55-832A-97D4314B76FA}"/>
-              </a:ext>
-            </a:extLst>
-          </p:cNvPr>
-          <p:cNvSpPr txBox="1"/>
-          <p:nvPr/>
-        </p:nvSpPr>
-        <p:spPr>
-          <a:xfrm>
-            <a:off x="23007" y="4881890"/>
-            <a:ext cx="1430200" cy="261610"/>
-          </a:xfrm>
-          <a:prstGeom prst="rect">
-            <a:avLst/>
-          </a:prstGeom>
-          <a:noFill/>
-        </p:spPr>
-        <p:txBody>
-          <a:bodyPr wrap="none" rtlCol="0">
-            <a:spAutoFit/>
-          </a:bodyPr>
-          <a:lstStyle/>
-          <a:p>
-            <a:r>
-              <a:rPr lang="en-IN" sz="1100" dirty="0">
-                <a:solidFill>
-                  <a:schemeClr val="bg1">
-                    <a:lumMod val="50000"/>
-                  </a:schemeClr>
-                </a:solidFill>
-                <a:latin typeface="Times New Roman" panose="02020603050405020304" pitchFamily="18" charset="0"/>
-                <a:cs typeface="Times New Roman" panose="02020603050405020304" pitchFamily="18" charset="0"/>
-              </a:rPr>
-              <a:t>EXISTING SYSTEM</a:t>
-            </a:r>
-          </a:p>
-        </p:txBody>
-      </p:sp>
       <p:sp>
         <p:nvSpPr>
           <p:cNvPr id="72" name="Google Shape;72;p16"/>
@@ -9829,49 +9399,6 @@
           </a:prstGeom>
         </p:spPr>
       </p:pic>
-      <p:sp>
-        <p:nvSpPr>
-          <p:cNvPr id="5" name="TextBox 4">
-            <a:extLst>
-              <a:ext uri="{FF2B5EF4-FFF2-40B4-BE49-F238E27FC236}">
-                <a16:creationId xmlns:a16="http://schemas.microsoft.com/office/drawing/2014/main" id="{C90E31AC-FF5A-43D7-9416-234015E49C5B}"/>
-              </a:ext>
-            </a:extLst>
-          </p:cNvPr>
-          <p:cNvSpPr txBox="1"/>
-          <p:nvPr/>
-        </p:nvSpPr>
-        <p:spPr>
-          <a:xfrm>
-            <a:off x="23007" y="4881890"/>
-            <a:ext cx="869149" cy="261610"/>
-          </a:xfrm>
-          <a:prstGeom prst="rect">
-            <a:avLst/>
-          </a:prstGeom>
-          <a:noFill/>
-        </p:spPr>
-        <p:txBody>
-          <a:bodyPr wrap="none" rtlCol="0">
-            <a:spAutoFit/>
-          </a:bodyPr>
-          <a:lstStyle/>
-          <a:p>
-            <a:r>
-              <a:rPr lang="en-IN" sz="1100" dirty="0">
-                <a:solidFill>
-                  <a:schemeClr val="bg1">
-                    <a:lumMod val="50000"/>
-                  </a:schemeClr>
-                </a:solidFill>
-                <a:latin typeface="Times New Roman" panose="02020603050405020304" pitchFamily="18" charset="0"/>
-                <a:cs typeface="Times New Roman" panose="02020603050405020304" pitchFamily="18" charset="0"/>
-              </a:rPr>
-              <a:t>WORKING</a:t>
-            </a:r>
-          </a:p>
-        </p:txBody>
-      </p:sp>
     </p:spTree>
     <p:extLst>
       <p:ext uri="{BB962C8B-B14F-4D97-AF65-F5344CB8AC3E}">
@@ -9991,49 +9518,6 @@
               <a:latin typeface="Times New Roman" panose="02020603050405020304" pitchFamily="18" charset="0"/>
               <a:cs typeface="Times New Roman" panose="02020603050405020304" pitchFamily="18" charset="0"/>
             </a:endParaRPr>
-          </a:p>
-        </p:txBody>
-      </p:sp>
-      <p:sp>
-        <p:nvSpPr>
-          <p:cNvPr id="4" name="TextBox 3">
-            <a:extLst>
-              <a:ext uri="{FF2B5EF4-FFF2-40B4-BE49-F238E27FC236}">
-                <a16:creationId xmlns:a16="http://schemas.microsoft.com/office/drawing/2014/main" id="{E1A1B6DE-DBD0-4EEE-A803-7E4F1B0545EC}"/>
-              </a:ext>
-            </a:extLst>
-          </p:cNvPr>
-          <p:cNvSpPr txBox="1"/>
-          <p:nvPr/>
-        </p:nvSpPr>
-        <p:spPr>
-          <a:xfrm>
-            <a:off x="23007" y="4881890"/>
-            <a:ext cx="869149" cy="261610"/>
-          </a:xfrm>
-          <a:prstGeom prst="rect">
-            <a:avLst/>
-          </a:prstGeom>
-          <a:noFill/>
-        </p:spPr>
-        <p:txBody>
-          <a:bodyPr wrap="none" rtlCol="0">
-            <a:spAutoFit/>
-          </a:bodyPr>
-          <a:lstStyle/>
-          <a:p>
-            <a:r>
-              <a:rPr lang="en-IN" sz="1100" dirty="0">
-                <a:solidFill>
-                  <a:schemeClr val="bg1">
-                    <a:lumMod val="50000"/>
-                  </a:schemeClr>
-                </a:solidFill>
-                <a:latin typeface="Times New Roman" panose="02020603050405020304" pitchFamily="18" charset="0"/>
-                <a:cs typeface="Times New Roman" panose="02020603050405020304" pitchFamily="18" charset="0"/>
-              </a:rPr>
-              <a:t>WORKING</a:t>
-            </a:r>
           </a:p>
         </p:txBody>
       </p:sp>

</xml_diff>